<commit_message>
updated assignment 3 to include in class dashboard
</commit_message>
<xml_diff>
--- a/deliverables/Team 5 - Assignment 3.pptx
+++ b/deliverables/Team 5 - Assignment 3.pptx
@@ -105,7 +105,41 @@
       </a:defRPr>
     </a:lvl9pPr>
   </p:defaultTextStyle>
+  <p:extLst>
+    <p:ext uri="{EFAFB233-063F-42B5-8137-9DF3F51BA10A}">
+      <p15:sldGuideLst xmlns:p15="http://schemas.microsoft.com/office/powerpoint/2012/main"/>
+    </p:ext>
+  </p:extLst>
 </p:presentation>
+</file>
+
+<file path=ppt/changesInfos/changesInfo1.xml><?xml version="1.0" encoding="utf-8"?>
+<pc:chgInfo xmlns:a="http://schemas.openxmlformats.org/drawingml/2006/main" xmlns:r="http://schemas.openxmlformats.org/officeDocument/2006/relationships" xmlns:ac="http://schemas.microsoft.com/office/drawing/2013/main/command" xmlns:pc="http://schemas.microsoft.com/office/powerpoint/2013/main/command">
+  <pc:docChgLst>
+    <pc:chgData name="Tremaine Johns" userId="3eb6b2d27c19f6c0" providerId="LiveId" clId="{2E8384F2-81EF-44C1-A033-80E63291BB1D}"/>
+    <pc:docChg chg="modSld">
+      <pc:chgData name="Tremaine Johns" userId="3eb6b2d27c19f6c0" providerId="LiveId" clId="{2E8384F2-81EF-44C1-A033-80E63291BB1D}" dt="2020-06-26T01:26:53.271" v="96" actId="20577"/>
+      <pc:docMkLst>
+        <pc:docMk/>
+      </pc:docMkLst>
+      <pc:sldChg chg="modSp mod">
+        <pc:chgData name="Tremaine Johns" userId="3eb6b2d27c19f6c0" providerId="LiveId" clId="{2E8384F2-81EF-44C1-A033-80E63291BB1D}" dt="2020-06-26T01:26:53.271" v="96" actId="20577"/>
+        <pc:sldMkLst>
+          <pc:docMk/>
+          <pc:sldMk cId="85174459" sldId="256"/>
+        </pc:sldMkLst>
+        <pc:spChg chg="mod">
+          <ac:chgData name="Tremaine Johns" userId="3eb6b2d27c19f6c0" providerId="LiveId" clId="{2E8384F2-81EF-44C1-A033-80E63291BB1D}" dt="2020-06-26T01:26:53.271" v="96" actId="20577"/>
+          <ac:spMkLst>
+            <pc:docMk/>
+            <pc:sldMk cId="85174459" sldId="256"/>
+            <ac:spMk id="5" creationId="{3D0C2CB1-F20E-433D-AC31-98012443D9DE}"/>
+          </ac:spMkLst>
+        </pc:spChg>
+      </pc:sldChg>
+    </pc:docChg>
+  </pc:docChgLst>
+</pc:chgInfo>
 </file>
 
 <file path=ppt/slideLayouts/slideLayout1.xml><?xml version="1.0" encoding="utf-8"?>
@@ -334,7 +368,7 @@
           <a:p>
             <a:fld id="{021F8261-DE10-4115-8DF6-A0FC21BAC6F7}" type="datetimeFigureOut">
               <a:rPr lang="en-US" smtClean="0"/>
-              <a:t>6/24/2020</a:t>
+              <a:t>6/25/2020</a:t>
             </a:fld>
             <a:endParaRPr lang="en-US"/>
           </a:p>
@@ -542,7 +576,7 @@
           <a:p>
             <a:fld id="{021F8261-DE10-4115-8DF6-A0FC21BAC6F7}" type="datetimeFigureOut">
               <a:rPr lang="en-US" smtClean="0"/>
-              <a:t>6/24/2020</a:t>
+              <a:t>6/25/2020</a:t>
             </a:fld>
             <a:endParaRPr lang="en-US"/>
           </a:p>
@@ -798,7 +832,7 @@
           <a:p>
             <a:fld id="{021F8261-DE10-4115-8DF6-A0FC21BAC6F7}" type="datetimeFigureOut">
               <a:rPr lang="en-US" smtClean="0"/>
-              <a:t>6/24/2020</a:t>
+              <a:t>6/25/2020</a:t>
             </a:fld>
             <a:endParaRPr lang="en-US"/>
           </a:p>
@@ -972,7 +1006,7 @@
           <a:p>
             <a:fld id="{021F8261-DE10-4115-8DF6-A0FC21BAC6F7}" type="datetimeFigureOut">
               <a:rPr lang="en-US" smtClean="0"/>
-              <a:t>6/24/2020</a:t>
+              <a:t>6/25/2020</a:t>
             </a:fld>
             <a:endParaRPr lang="en-US"/>
           </a:p>
@@ -1315,7 +1349,7 @@
           <a:p>
             <a:fld id="{021F8261-DE10-4115-8DF6-A0FC21BAC6F7}" type="datetimeFigureOut">
               <a:rPr lang="en-US" smtClean="0"/>
-              <a:t>6/24/2020</a:t>
+              <a:t>6/25/2020</a:t>
             </a:fld>
             <a:endParaRPr lang="en-US"/>
           </a:p>
@@ -1590,7 +1624,7 @@
           <a:p>
             <a:fld id="{021F8261-DE10-4115-8DF6-A0FC21BAC6F7}" type="datetimeFigureOut">
               <a:rPr lang="en-US" smtClean="0"/>
-              <a:t>6/24/2020</a:t>
+              <a:t>6/25/2020</a:t>
             </a:fld>
             <a:endParaRPr lang="en-US"/>
           </a:p>
@@ -1969,7 +2003,7 @@
           <a:p>
             <a:fld id="{021F8261-DE10-4115-8DF6-A0FC21BAC6F7}" type="datetimeFigureOut">
               <a:rPr lang="en-US" smtClean="0"/>
-              <a:t>6/24/2020</a:t>
+              <a:t>6/25/2020</a:t>
             </a:fld>
             <a:endParaRPr lang="en-US"/>
           </a:p>
@@ -2087,7 +2121,7 @@
           <a:p>
             <a:fld id="{021F8261-DE10-4115-8DF6-A0FC21BAC6F7}" type="datetimeFigureOut">
               <a:rPr lang="en-US" smtClean="0"/>
-              <a:t>6/24/2020</a:t>
+              <a:t>6/25/2020</a:t>
             </a:fld>
             <a:endParaRPr lang="en-US"/>
           </a:p>
@@ -2258,7 +2292,7 @@
           <a:p>
             <a:fld id="{021F8261-DE10-4115-8DF6-A0FC21BAC6F7}" type="datetimeFigureOut">
               <a:rPr lang="en-US" smtClean="0"/>
-              <a:t>6/24/2020</a:t>
+              <a:t>6/25/2020</a:t>
             </a:fld>
             <a:endParaRPr lang="en-US"/>
           </a:p>
@@ -2612,7 +2646,7 @@
           <a:p>
             <a:fld id="{021F8261-DE10-4115-8DF6-A0FC21BAC6F7}" type="datetimeFigureOut">
               <a:rPr lang="en-US" smtClean="0"/>
-              <a:t>6/24/2020</a:t>
+              <a:t>6/25/2020</a:t>
             </a:fld>
             <a:endParaRPr lang="en-US"/>
           </a:p>
@@ -2994,7 +3028,7 @@
           <a:p>
             <a:fld id="{021F8261-DE10-4115-8DF6-A0FC21BAC6F7}" type="datetimeFigureOut">
               <a:rPr lang="en-US" smtClean="0"/>
-              <a:t>6/24/2020</a:t>
+              <a:t>6/25/2020</a:t>
             </a:fld>
             <a:endParaRPr lang="en-US"/>
           </a:p>
@@ -3281,7 +3315,7 @@
           <a:p>
             <a:fld id="{021F8261-DE10-4115-8DF6-A0FC21BAC6F7}" type="datetimeFigureOut">
               <a:rPr lang="en-US" smtClean="0"/>
-              <a:t>6/24/2020</a:t>
+              <a:t>6/25/2020</a:t>
             </a:fld>
             <a:endParaRPr lang="en-US"/>
           </a:p>
@@ -3896,7 +3930,7 @@
         <p:spPr>
           <a:xfrm>
             <a:off x="727788" y="802105"/>
-            <a:ext cx="4574266" cy="400110"/>
+            <a:ext cx="6300379" cy="677108"/>
           </a:xfrm>
           <a:prstGeom prst="rect">
             <a:avLst/>
@@ -3913,6 +3947,33 @@
               <a:rPr lang="en-US" sz="2000" b="1" dirty="0"/>
               <a:t>Team 5 – American University Enrollment</a:t>
             </a:r>
+          </a:p>
+          <a:p>
+            <a:r>
+              <a:rPr lang="en-US" dirty="0" err="1"/>
+              <a:t>Badr</a:t>
+            </a:r>
+            <a:r>
+              <a:rPr lang="en-US" dirty="0"/>
+              <a:t> </a:t>
+            </a:r>
+            <a:r>
+              <a:rPr lang="en-US" dirty="0" err="1"/>
+              <a:t>Albrikan</a:t>
+            </a:r>
+            <a:r>
+              <a:rPr lang="en-US" dirty="0"/>
+              <a:t>, Victor Brew, Shijin Gai, Tremaine Johns, </a:t>
+            </a:r>
+            <a:r>
+              <a:rPr lang="en-US" dirty="0" err="1"/>
+              <a:t>Xiaolin</a:t>
+            </a:r>
+            <a:r>
+              <a:rPr lang="en-US"/>
+              <a:t> Wu</a:t>
+            </a:r>
+            <a:endParaRPr lang="en-US" dirty="0"/>
           </a:p>
         </p:txBody>
       </p:sp>

</xml_diff>